<commit_message>
Update Reset Buttons and Documentation
</commit_message>
<xml_diff>
--- a/documents/galaxycoders.pptx
+++ b/documents/galaxycoders.pptx
@@ -205,7 +205,7 @@
           </a:lstStyle>
           <a:p>
             <a:fld id="{10FED6FA-DE26-42AB-AB2C-D8DCFF6885BC}" type="datetimeFigureOut">
-              <a:t>26.02.2024</a:t>
+              <a:t>2/28/2024</a:t>
             </a:fld>
             <a:endParaRPr lang="ru-RU"/>
           </a:p>
@@ -1032,18 +1032,7 @@
                 <a:ea typeface="+mn-lt"/>
                 <a:cs typeface="+mn-lt"/>
               </a:rPr>
-              <a:t>Team </a:t>
-            </a:r>
-            <a:r>
-              <a:rPr lang="en-US" sz="8000" b="1" kern="0" spc="-35" dirty="0" err="1">
-                <a:solidFill>
-                  <a:schemeClr val="bg1"/>
-                </a:solidFill>
-                <a:latin typeface="Consolas"/>
-                <a:ea typeface="+mn-lt"/>
-                <a:cs typeface="+mn-lt"/>
-              </a:rPr>
-              <a:t>Galaxycoders</a:t>
+              <a:t>Team Galaxy Coders</a:t>
             </a:r>
             <a:endParaRPr lang="ru-RU" sz="8000" b="1" dirty="0">
               <a:solidFill>
@@ -1171,10 +1160,7 @@
             </a:avLst>
           </a:prstGeom>
           <a:solidFill>
-            <a:schemeClr val="accent1">
-              <a:lumMod val="60000"/>
-              <a:lumOff val="40000"/>
-            </a:schemeClr>
+            <a:schemeClr val="accent6"/>
           </a:solidFill>
           <a:ln w="13811">
             <a:solidFill>
@@ -1393,9 +1379,7 @@
             </a:avLst>
           </a:prstGeom>
           <a:solidFill>
-            <a:schemeClr val="accent1">
-              <a:lumMod val="75000"/>
-            </a:schemeClr>
+            <a:schemeClr val="accent1"/>
           </a:solidFill>
           <a:ln w="13811">
             <a:solidFill>
@@ -1445,7 +1429,7 @@
                 </a:solidFill>
                 <a:latin typeface="Inter"/>
               </a:rPr>
-              <a:t>Front-End Developer</a:t>
+              <a:t>Back-End Developer</a:t>
             </a:r>
           </a:p>
         </p:txBody>
@@ -1588,200 +1572,6 @@
         <p:spPr>
           <a:xfrm>
             <a:off x="2037993" y="4795242"/>
-            <a:ext cx="5166122" cy="2373987"/>
-          </a:xfrm>
-          <a:prstGeom prst="roundRect">
-            <a:avLst>
-              <a:gd name="adj" fmla="val 4212"/>
-            </a:avLst>
-          </a:prstGeom>
-          <a:solidFill>
-            <a:schemeClr val="accent6">
-              <a:lumMod val="60000"/>
-              <a:lumOff val="40000"/>
-            </a:schemeClr>
-          </a:solidFill>
-          <a:ln w="13811">
-            <a:solidFill>
-              <a:srgbClr val="140099"/>
-            </a:solidFill>
-            <a:prstDash val="solid"/>
-          </a:ln>
-        </p:spPr>
-        <p:txBody>
-          <a:bodyPr/>
-          <a:lstStyle/>
-          <a:p>
-            <a:endParaRPr lang="ru-RU"/>
-          </a:p>
-        </p:txBody>
-      </p:sp>
-      <p:sp>
-        <p:nvSpPr>
-          <p:cNvPr id="12" name="Text 10"/>
-          <p:cNvSpPr/>
-          <p:nvPr/>
-        </p:nvSpPr>
-        <p:spPr>
-          <a:xfrm>
-            <a:off x="2273975" y="5031224"/>
-            <a:ext cx="2673888" cy="347186"/>
-          </a:xfrm>
-          <a:prstGeom prst="rect">
-            <a:avLst/>
-          </a:prstGeom>
-          <a:noFill/>
-          <a:ln/>
-        </p:spPr>
-        <p:txBody>
-          <a:bodyPr wrap="none" lIns="91440" tIns="45720" rIns="91440" bIns="45720" rtlCol="0" anchor="t"/>
-          <a:lstStyle/>
-          <a:p>
-            <a:pPr>
-              <a:lnSpc>
-                <a:spcPts val="2734"/>
-              </a:lnSpc>
-            </a:pPr>
-            <a:r>
-              <a:rPr lang="en-US" sz="2400" b="1" kern="0" spc="-66" dirty="0">
-                <a:solidFill>
-                  <a:srgbClr val="E5E0DF"/>
-                </a:solidFill>
-                <a:ea typeface="+mn-lt"/>
-                <a:cs typeface="+mn-lt"/>
-              </a:rPr>
-              <a:t>Front-End Developer</a:t>
-            </a:r>
-            <a:endParaRPr lang="ru-RU" sz="2400" dirty="0"/>
-          </a:p>
-        </p:txBody>
-      </p:sp>
-      <p:sp>
-        <p:nvSpPr>
-          <p:cNvPr id="13" name="Text 11"/>
-          <p:cNvSpPr/>
-          <p:nvPr/>
-        </p:nvSpPr>
-        <p:spPr>
-          <a:xfrm>
-            <a:off x="2273975" y="5511641"/>
-            <a:ext cx="1845855" cy="1421606"/>
-          </a:xfrm>
-          <a:prstGeom prst="rect">
-            <a:avLst/>
-          </a:prstGeom>
-          <a:noFill/>
-          <a:ln/>
-        </p:spPr>
-        <p:txBody>
-          <a:bodyPr wrap="square" lIns="91440" tIns="45720" rIns="91440" bIns="45720" rtlCol="0" anchor="t"/>
-          <a:lstStyle/>
-          <a:p>
-            <a:pPr>
-              <a:lnSpc>
-                <a:spcPts val="2799"/>
-              </a:lnSpc>
-            </a:pPr>
-            <a:r>
-              <a:rPr lang="en-US" sz="1750" b="1" kern="0" spc="-35" dirty="0" err="1">
-                <a:solidFill>
-                  <a:srgbClr val="E5E0DF"/>
-                </a:solidFill>
-                <a:latin typeface="Inter"/>
-              </a:rPr>
-              <a:t>Никита</a:t>
-            </a:r>
-            <a:endParaRPr lang="en-US" sz="1750" b="1" kern="0" spc="-35">
-              <a:solidFill>
-                <a:srgbClr val="E5E0DF"/>
-              </a:solidFill>
-              <a:latin typeface="Inter"/>
-              <a:ea typeface="Inter"/>
-            </a:endParaRPr>
-          </a:p>
-          <a:p>
-            <a:pPr>
-              <a:lnSpc>
-                <a:spcPts val="2799"/>
-              </a:lnSpc>
-            </a:pPr>
-            <a:r>
-              <a:rPr lang="en-US" sz="1750" b="1" kern="0" spc="-35" err="1">
-                <a:solidFill>
-                  <a:srgbClr val="E5E0DF"/>
-                </a:solidFill>
-                <a:latin typeface="Inter"/>
-              </a:rPr>
-              <a:t>Вячеславович</a:t>
-            </a:r>
-            <a:endParaRPr lang="en-US" sz="1750" b="1" kern="0" spc="-35" dirty="0" err="1">
-              <a:solidFill>
-                <a:srgbClr val="E5E0DF"/>
-              </a:solidFill>
-              <a:latin typeface="Inter"/>
-            </a:endParaRPr>
-          </a:p>
-          <a:p>
-            <a:pPr>
-              <a:lnSpc>
-                <a:spcPts val="2799"/>
-              </a:lnSpc>
-            </a:pPr>
-            <a:r>
-              <a:rPr lang="en-US" sz="1750" b="1" kern="0" spc="-35" dirty="0" err="1">
-                <a:solidFill>
-                  <a:srgbClr val="E5E0DF"/>
-                </a:solidFill>
-                <a:latin typeface="Inter"/>
-              </a:rPr>
-              <a:t>Баландин</a:t>
-            </a:r>
-            <a:endParaRPr lang="en-US" sz="1750" b="1" kern="0" spc="-35">
-              <a:solidFill>
-                <a:srgbClr val="E5E0DF"/>
-              </a:solidFill>
-              <a:latin typeface="Inter"/>
-              <a:ea typeface="Inter"/>
-            </a:endParaRPr>
-          </a:p>
-          <a:p>
-            <a:pPr>
-              <a:lnSpc>
-                <a:spcPts val="2799"/>
-              </a:lnSpc>
-            </a:pPr>
-            <a:r>
-              <a:rPr lang="en-US" sz="1750" b="1" kern="0" spc="-35" dirty="0">
-                <a:solidFill>
-                  <a:srgbClr val="E5E0DF"/>
-                </a:solidFill>
-                <a:latin typeface="Inter"/>
-                <a:ea typeface="Inter"/>
-              </a:rPr>
-              <a:t>9В </a:t>
-            </a:r>
-            <a:r>
-              <a:rPr lang="en-US" sz="1750" b="1" kern="0" spc="-35" dirty="0" err="1">
-                <a:solidFill>
-                  <a:srgbClr val="E5E0DF"/>
-                </a:solidFill>
-                <a:latin typeface="Inter"/>
-                <a:ea typeface="Inter"/>
-              </a:rPr>
-              <a:t>клас</a:t>
-            </a:r>
-          </a:p>
-        </p:txBody>
-      </p:sp>
-      <p:sp>
-        <p:nvSpPr>
-          <p:cNvPr id="14" name="Shape 12"/>
-          <p:cNvSpPr/>
-          <p:nvPr/>
-        </p:nvSpPr>
-        <p:spPr>
-          <a:xfrm>
-            <a:off x="7426285" y="4795242"/>
             <a:ext cx="5166122" cy="2373987"/>
           </a:xfrm>
           <a:prstGeom prst="roundRect">
@@ -1809,14 +1599,14 @@
       </p:sp>
       <p:sp>
         <p:nvSpPr>
-          <p:cNvPr id="15" name="Text 13"/>
+          <p:cNvPr id="12" name="Text 10"/>
           <p:cNvSpPr/>
           <p:nvPr/>
         </p:nvSpPr>
         <p:spPr>
           <a:xfrm>
-            <a:off x="7662267" y="5031224"/>
-            <a:ext cx="2221944" cy="347186"/>
+            <a:off x="2273975" y="5031224"/>
+            <a:ext cx="2673888" cy="347186"/>
           </a:xfrm>
           <a:prstGeom prst="rect">
             <a:avLst/>
@@ -1834,7 +1624,7 @@
               </a:lnSpc>
             </a:pPr>
             <a:r>
-              <a:rPr lang="en-US" sz="2150" b="1" kern="0" spc="-66" dirty="0">
+              <a:rPr lang="en-US" sz="2400" b="1" kern="0" spc="-66" dirty="0">
                 <a:solidFill>
                   <a:srgbClr val="E5E0DF"/>
                 </a:solidFill>
@@ -1842,6 +1632,197 @@
                 <a:cs typeface="+mn-lt"/>
               </a:rPr>
               <a:t>Front-End Developer</a:t>
+            </a:r>
+            <a:endParaRPr lang="ru-RU" sz="2400" dirty="0"/>
+          </a:p>
+        </p:txBody>
+      </p:sp>
+      <p:sp>
+        <p:nvSpPr>
+          <p:cNvPr id="13" name="Text 11"/>
+          <p:cNvSpPr/>
+          <p:nvPr/>
+        </p:nvSpPr>
+        <p:spPr>
+          <a:xfrm>
+            <a:off x="2273975" y="5511641"/>
+            <a:ext cx="1845855" cy="1421606"/>
+          </a:xfrm>
+          <a:prstGeom prst="rect">
+            <a:avLst/>
+          </a:prstGeom>
+          <a:noFill/>
+          <a:ln/>
+        </p:spPr>
+        <p:txBody>
+          <a:bodyPr wrap="square" lIns="91440" tIns="45720" rIns="91440" bIns="45720" rtlCol="0" anchor="t"/>
+          <a:lstStyle/>
+          <a:p>
+            <a:pPr>
+              <a:lnSpc>
+                <a:spcPts val="2799"/>
+              </a:lnSpc>
+            </a:pPr>
+            <a:r>
+              <a:rPr lang="en-US" sz="1750" b="1" kern="0" spc="-35" dirty="0" err="1">
+                <a:solidFill>
+                  <a:srgbClr val="E5E0DF"/>
+                </a:solidFill>
+                <a:latin typeface="Inter"/>
+              </a:rPr>
+              <a:t>Никита</a:t>
+            </a:r>
+            <a:endParaRPr lang="en-US" sz="1750" b="1" kern="0" spc="-35">
+              <a:solidFill>
+                <a:srgbClr val="E5E0DF"/>
+              </a:solidFill>
+              <a:latin typeface="Inter"/>
+              <a:ea typeface="Inter"/>
+            </a:endParaRPr>
+          </a:p>
+          <a:p>
+            <a:pPr>
+              <a:lnSpc>
+                <a:spcPts val="2799"/>
+              </a:lnSpc>
+            </a:pPr>
+            <a:r>
+              <a:rPr lang="en-US" sz="1750" b="1" kern="0" spc="-35" err="1">
+                <a:solidFill>
+                  <a:srgbClr val="E5E0DF"/>
+                </a:solidFill>
+                <a:latin typeface="Inter"/>
+              </a:rPr>
+              <a:t>Вячеславович</a:t>
+            </a:r>
+            <a:endParaRPr lang="en-US" sz="1750" b="1" kern="0" spc="-35" dirty="0" err="1">
+              <a:solidFill>
+                <a:srgbClr val="E5E0DF"/>
+              </a:solidFill>
+              <a:latin typeface="Inter"/>
+            </a:endParaRPr>
+          </a:p>
+          <a:p>
+            <a:pPr>
+              <a:lnSpc>
+                <a:spcPts val="2799"/>
+              </a:lnSpc>
+            </a:pPr>
+            <a:r>
+              <a:rPr lang="en-US" sz="1750" b="1" kern="0" spc="-35" dirty="0" err="1">
+                <a:solidFill>
+                  <a:srgbClr val="E5E0DF"/>
+                </a:solidFill>
+                <a:latin typeface="Inter"/>
+              </a:rPr>
+              <a:t>Баландин</a:t>
+            </a:r>
+            <a:endParaRPr lang="en-US" sz="1750" b="1" kern="0" spc="-35">
+              <a:solidFill>
+                <a:srgbClr val="E5E0DF"/>
+              </a:solidFill>
+              <a:latin typeface="Inter"/>
+              <a:ea typeface="Inter"/>
+            </a:endParaRPr>
+          </a:p>
+          <a:p>
+            <a:pPr>
+              <a:lnSpc>
+                <a:spcPts val="2799"/>
+              </a:lnSpc>
+            </a:pPr>
+            <a:r>
+              <a:rPr lang="en-US" sz="1750" b="1" kern="0" spc="-35" dirty="0">
+                <a:solidFill>
+                  <a:srgbClr val="E5E0DF"/>
+                </a:solidFill>
+                <a:latin typeface="Inter"/>
+                <a:ea typeface="Inter"/>
+              </a:rPr>
+              <a:t>9В </a:t>
+            </a:r>
+            <a:r>
+              <a:rPr lang="en-US" sz="1750" b="1" kern="0" spc="-35" dirty="0" err="1">
+                <a:solidFill>
+                  <a:srgbClr val="E5E0DF"/>
+                </a:solidFill>
+                <a:latin typeface="Inter"/>
+                <a:ea typeface="Inter"/>
+              </a:rPr>
+              <a:t>клас</a:t>
+            </a:r>
+          </a:p>
+        </p:txBody>
+      </p:sp>
+      <p:sp>
+        <p:nvSpPr>
+          <p:cNvPr id="14" name="Shape 12"/>
+          <p:cNvSpPr/>
+          <p:nvPr/>
+        </p:nvSpPr>
+        <p:spPr>
+          <a:xfrm>
+            <a:off x="7426285" y="4795242"/>
+            <a:ext cx="5166122" cy="2373987"/>
+          </a:xfrm>
+          <a:prstGeom prst="roundRect">
+            <a:avLst>
+              <a:gd name="adj" fmla="val 4212"/>
+            </a:avLst>
+          </a:prstGeom>
+          <a:solidFill>
+            <a:schemeClr val="accent1"/>
+          </a:solidFill>
+          <a:ln w="13811">
+            <a:solidFill>
+              <a:srgbClr val="140099"/>
+            </a:solidFill>
+            <a:prstDash val="solid"/>
+          </a:ln>
+        </p:spPr>
+        <p:txBody>
+          <a:bodyPr/>
+          <a:lstStyle/>
+          <a:p>
+            <a:endParaRPr lang="ru-RU"/>
+          </a:p>
+        </p:txBody>
+      </p:sp>
+      <p:sp>
+        <p:nvSpPr>
+          <p:cNvPr id="15" name="Text 13"/>
+          <p:cNvSpPr/>
+          <p:nvPr/>
+        </p:nvSpPr>
+        <p:spPr>
+          <a:xfrm>
+            <a:off x="7662267" y="5031224"/>
+            <a:ext cx="2221944" cy="347186"/>
+          </a:xfrm>
+          <a:prstGeom prst="rect">
+            <a:avLst/>
+          </a:prstGeom>
+          <a:noFill/>
+          <a:ln/>
+        </p:spPr>
+        <p:txBody>
+          <a:bodyPr wrap="none" lIns="91440" tIns="45720" rIns="91440" bIns="45720" rtlCol="0" anchor="t"/>
+          <a:lstStyle/>
+          <a:p>
+            <a:pPr>
+              <a:lnSpc>
+                <a:spcPts val="2734"/>
+              </a:lnSpc>
+            </a:pPr>
+            <a:r>
+              <a:rPr lang="en-US" sz="2150" b="1" kern="0" spc="-66" dirty="0">
+                <a:solidFill>
+                  <a:srgbClr val="E5E0DF"/>
+                </a:solidFill>
+                <a:ea typeface="+mn-lt"/>
+                <a:cs typeface="+mn-lt"/>
+              </a:rPr>
+              <a:t>Back-End Developer</a:t>
             </a:r>
             <a:endParaRPr lang="ru-RU" sz="2150" dirty="0"/>
           </a:p>
@@ -2179,7 +2160,7 @@
         </p:nvSpPr>
         <p:spPr>
           <a:xfrm>
-            <a:off x="590307" y="2890176"/>
+            <a:off x="555260" y="3459350"/>
             <a:ext cx="6724893" cy="2123658"/>
           </a:xfrm>
           <a:prstGeom prst="rect">
@@ -2199,10 +2180,8 @@
                   <a:schemeClr val="bg1"/>
                 </a:solidFill>
               </a:rPr>
-              <a:t>В нашата игра се говори за Хигс Бозонът</a:t>
-            </a:r>
-          </a:p>
-          <a:p>
+              <a:t>Идеята за играта е да е безкрайна игра с информативна функция.</a:t>
+            </a:r>
             <a:endParaRPr lang="en-US" sz="4400" dirty="0">
               <a:solidFill>
                 <a:schemeClr val="bg1"/>
@@ -2225,7 +2204,7 @@
         </p:nvSpPr>
         <p:spPr>
           <a:xfrm>
-            <a:off x="590307" y="1830775"/>
+            <a:off x="555260" y="2351354"/>
             <a:ext cx="6064493" cy="1107996"/>
           </a:xfrm>
           <a:prstGeom prst="rect">
@@ -2284,7 +2263,7 @@
         </p:blipFill>
         <p:spPr bwMode="auto">
           <a:xfrm>
-            <a:off x="7905506" y="1830775"/>
+            <a:off x="8112490" y="2441302"/>
             <a:ext cx="5962650" cy="3314700"/>
           </a:xfrm>
           <a:prstGeom prst="rect">
@@ -2300,6 +2279,36 @@
               </a14:hiddenFill>
             </a:ext>
           </a:extLst>
+        </p:spPr>
+      </p:pic>
+      <p:pic>
+        <p:nvPicPr>
+          <p:cNvPr id="2" name="Picture 1">
+            <a:extLst>
+              <a:ext uri="{FF2B5EF4-FFF2-40B4-BE49-F238E27FC236}">
+                <a16:creationId xmlns:a16="http://schemas.microsoft.com/office/drawing/2014/main" id="{DD6C8A18-2119-43EC-88CC-10CACD3D8EE6}"/>
+              </a:ext>
+            </a:extLst>
+          </p:cNvPr>
+          <p:cNvPicPr>
+            <a:picLocks noChangeAspect="1"/>
+          </p:cNvPicPr>
+          <p:nvPr/>
+        </p:nvPicPr>
+        <p:blipFill>
+          <a:blip r:embed="rId4"/>
+          <a:stretch>
+            <a:fillRect/>
+          </a:stretch>
+        </p:blipFill>
+        <p:spPr>
+          <a:xfrm>
+            <a:off x="8112490" y="2441302"/>
+            <a:ext cx="5962650" cy="3346995"/>
+          </a:xfrm>
+          <a:prstGeom prst="rect">
+            <a:avLst/>
+          </a:prstGeom>
         </p:spPr>
       </p:pic>
     </p:spTree>
@@ -2407,73 +2416,6 @@
       </p:sp>
       <p:pic>
         <p:nvPicPr>
-          <p:cNvPr id="6" name="Picture 5">
-            <a:extLst>
-              <a:ext uri="{FF2B5EF4-FFF2-40B4-BE49-F238E27FC236}">
-                <a16:creationId xmlns:a16="http://schemas.microsoft.com/office/drawing/2014/main" id="{C163A62C-DBAF-4CAF-8A9F-263E9853FC22}"/>
-              </a:ext>
-            </a:extLst>
-          </p:cNvPr>
-          <p:cNvPicPr>
-            <a:picLocks noChangeAspect="1"/>
-          </p:cNvPicPr>
-          <p:nvPr/>
-        </p:nvPicPr>
-        <p:blipFill>
-          <a:blip r:embed="rId3"/>
-          <a:stretch>
-            <a:fillRect/>
-          </a:stretch>
-        </p:blipFill>
-        <p:spPr>
-          <a:xfrm>
-            <a:off x="1524000" y="2591094"/>
-            <a:ext cx="2174240" cy="2174240"/>
-          </a:xfrm>
-          <a:prstGeom prst="rect">
-            <a:avLst/>
-          </a:prstGeom>
-        </p:spPr>
-      </p:pic>
-      <p:pic>
-        <p:nvPicPr>
-          <p:cNvPr id="8" name="Picture 7">
-            <a:extLst>
-              <a:ext uri="{FF2B5EF4-FFF2-40B4-BE49-F238E27FC236}">
-                <a16:creationId xmlns:a16="http://schemas.microsoft.com/office/drawing/2014/main" id="{024E3C48-3C30-408D-9B0D-909D234AD558}"/>
-              </a:ext>
-            </a:extLst>
-          </p:cNvPr>
-          <p:cNvPicPr>
-            <a:picLocks noChangeAspect="1"/>
-          </p:cNvPicPr>
-          <p:nvPr/>
-        </p:nvPicPr>
-        <p:blipFill>
-          <a:blip r:embed="rId4"/>
-          <a:stretch>
-            <a:fillRect/>
-          </a:stretch>
-        </p:blipFill>
-        <p:spPr>
-          <a:xfrm>
-            <a:off x="4216401" y="2591095"/>
-            <a:ext cx="2174239" cy="2174239"/>
-          </a:xfrm>
-          <a:prstGeom prst="rect">
-            <a:avLst/>
-          </a:prstGeom>
-          <a:effectLst>
-            <a:glow rad="152400">
-              <a:schemeClr val="accent1">
-                <a:alpha val="78000"/>
-              </a:schemeClr>
-            </a:glow>
-          </a:effectLst>
-        </p:spPr>
-      </p:pic>
-      <p:pic>
-        <p:nvPicPr>
           <p:cNvPr id="18" name="Picture 17">
             <a:extLst>
               <a:ext uri="{FF2B5EF4-FFF2-40B4-BE49-F238E27FC236}">
@@ -2487,7 +2429,7 @@
           <p:nvPr/>
         </p:nvPicPr>
         <p:blipFill>
-          <a:blip r:embed="rId5"/>
+          <a:blip r:embed="rId3"/>
           <a:stretch>
             <a:fillRect/>
           </a:stretch>
@@ -2517,7 +2459,7 @@
           <p:nvPr/>
         </p:nvPicPr>
         <p:blipFill>
-          <a:blip r:embed="rId6"/>
+          <a:blip r:embed="rId4"/>
           <a:stretch>
             <a:fillRect/>
           </a:stretch>
@@ -2547,7 +2489,7 @@
           <p:nvPr/>
         </p:nvPicPr>
         <p:blipFill>
-          <a:blip r:embed="rId7"/>
+          <a:blip r:embed="rId5"/>
           <a:stretch>
             <a:fillRect/>
           </a:stretch>
@@ -2577,6 +2519,66 @@
           <p:nvPr/>
         </p:nvPicPr>
         <p:blipFill>
+          <a:blip r:embed="rId6"/>
+          <a:stretch>
+            <a:fillRect/>
+          </a:stretch>
+        </p:blipFill>
+        <p:spPr>
+          <a:xfrm>
+            <a:off x="8650346" y="4728288"/>
+            <a:ext cx="2763542" cy="2763542"/>
+          </a:xfrm>
+          <a:prstGeom prst="rect">
+            <a:avLst/>
+          </a:prstGeom>
+        </p:spPr>
+      </p:pic>
+      <p:pic>
+        <p:nvPicPr>
+          <p:cNvPr id="5" name="Picture 4">
+            <a:extLst>
+              <a:ext uri="{FF2B5EF4-FFF2-40B4-BE49-F238E27FC236}">
+                <a16:creationId xmlns:a16="http://schemas.microsoft.com/office/drawing/2014/main" id="{E0B674A5-28CD-46BB-97CB-94E1B474466F}"/>
+              </a:ext>
+            </a:extLst>
+          </p:cNvPr>
+          <p:cNvPicPr>
+            <a:picLocks noChangeAspect="1"/>
+          </p:cNvPicPr>
+          <p:nvPr/>
+        </p:nvPicPr>
+        <p:blipFill>
+          <a:blip r:embed="rId7"/>
+          <a:stretch>
+            <a:fillRect/>
+          </a:stretch>
+        </p:blipFill>
+        <p:spPr>
+          <a:xfrm>
+            <a:off x="255667" y="2136911"/>
+            <a:ext cx="4572000" cy="3126365"/>
+          </a:xfrm>
+          <a:prstGeom prst="rect">
+            <a:avLst/>
+          </a:prstGeom>
+        </p:spPr>
+      </p:pic>
+      <p:pic>
+        <p:nvPicPr>
+          <p:cNvPr id="11" name="Picture 10">
+            <a:extLst>
+              <a:ext uri="{FF2B5EF4-FFF2-40B4-BE49-F238E27FC236}">
+                <a16:creationId xmlns:a16="http://schemas.microsoft.com/office/drawing/2014/main" id="{4BE54DB5-1C5D-48F2-9706-E86BC0C82500}"/>
+              </a:ext>
+            </a:extLst>
+          </p:cNvPr>
+          <p:cNvPicPr>
+            <a:picLocks noChangeAspect="1"/>
+          </p:cNvPicPr>
+          <p:nvPr/>
+        </p:nvPicPr>
+        <p:blipFill>
           <a:blip r:embed="rId8"/>
           <a:stretch>
             <a:fillRect/>
@@ -2584,8 +2586,8 @@
         </p:blipFill>
         <p:spPr>
           <a:xfrm>
-            <a:off x="8650346" y="4728288"/>
-            <a:ext cx="2763542" cy="2763542"/>
+            <a:off x="10393658" y="2742832"/>
+            <a:ext cx="1943100" cy="1914525"/>
           </a:xfrm>
           <a:prstGeom prst="rect">
             <a:avLst/>
@@ -2594,47 +2596,32 @@
       </p:pic>
       <p:pic>
         <p:nvPicPr>
-          <p:cNvPr id="3082" name="Picture 10">
+          <p:cNvPr id="13" name="Picture 12">
             <a:extLst>
               <a:ext uri="{FF2B5EF4-FFF2-40B4-BE49-F238E27FC236}">
-                <a16:creationId xmlns:a16="http://schemas.microsoft.com/office/drawing/2014/main" id="{F7F2AD1A-4DD4-9886-0E92-E12B6F2E1B58}"/>
+                <a16:creationId xmlns:a16="http://schemas.microsoft.com/office/drawing/2014/main" id="{AEA81C21-B714-4B24-B0F4-5CEFCED5D9CC}"/>
               </a:ext>
             </a:extLst>
           </p:cNvPr>
           <p:cNvPicPr>
-            <a:picLocks noChangeAspect="1" noChangeArrowheads="1"/>
+            <a:picLocks noChangeAspect="1"/>
           </p:cNvPicPr>
           <p:nvPr/>
         </p:nvPicPr>
-        <p:blipFill rotWithShape="1">
-          <a:blip r:embed="rId9">
-            <a:extLst>
-              <a:ext uri="{28A0092B-C50C-407E-A947-70E740481C1C}">
-                <a14:useLocalDpi xmlns:a14="http://schemas.microsoft.com/office/drawing/2010/main" val="0"/>
-              </a:ext>
-            </a:extLst>
-          </a:blip>
-          <a:srcRect l="3199" t="7497" r="2198" b="8949"/>
-          <a:stretch/>
+        <p:blipFill>
+          <a:blip r:embed="rId9"/>
+          <a:stretch>
+            <a:fillRect/>
+          </a:stretch>
         </p:blipFill>
-        <p:spPr bwMode="auto">
-          <a:xfrm>
-            <a:off x="10032117" y="2782864"/>
-            <a:ext cx="2027475" cy="1790700"/>
-          </a:xfrm>
-          <a:prstGeom prst="rect">
-            <a:avLst/>
-          </a:prstGeom>
-          <a:noFill/>
-          <a:extLst>
-            <a:ext uri="{909E8E84-426E-40DD-AFC4-6F175D3DCCD1}">
-              <a14:hiddenFill xmlns:a14="http://schemas.microsoft.com/office/drawing/2010/main">
-                <a:solidFill>
-                  <a:srgbClr val="FFFFFF"/>
-                </a:solidFill>
-              </a14:hiddenFill>
-            </a:ext>
-          </a:extLst>
+        <p:spPr>
+          <a:xfrm>
+            <a:off x="4098688" y="2535454"/>
+            <a:ext cx="2293938" cy="2226734"/>
+          </a:xfrm>
+          <a:prstGeom prst="rect">
+            <a:avLst/>
+          </a:prstGeom>
         </p:spPr>
       </p:pic>
     </p:spTree>
@@ -2710,8 +2697,8 @@
         </p:nvSpPr>
         <p:spPr>
           <a:xfrm>
-            <a:off x="1939290" y="3937718"/>
-            <a:ext cx="10751820" cy="1200329"/>
+            <a:off x="2127553" y="3514635"/>
+            <a:ext cx="10375293" cy="1200329"/>
           </a:xfrm>
           <a:prstGeom prst="rect">
             <a:avLst/>

</xml_diff>